<commit_message>
Trabajo en la tarea 1
</commit_message>
<xml_diff>
--- a/documentation/Metaheurística Tarea 1 arreglos.pptx
+++ b/documentation/Metaheurística Tarea 1 arreglos.pptx
@@ -5,7 +5,7 @@
     <p:sldMasterId id="2147483648" r:id="rId1"/>
   </p:sldMasterIdLst>
   <p:notesMasterIdLst>
-    <p:notesMasterId r:id="rId22"/>
+    <p:notesMasterId r:id="rId24"/>
   </p:notesMasterIdLst>
   <p:sldIdLst>
     <p:sldId id="276" r:id="rId2"/>
@@ -18,16 +18,18 @@
     <p:sldId id="277" r:id="rId9"/>
     <p:sldId id="274" r:id="rId10"/>
     <p:sldId id="279" r:id="rId11"/>
-    <p:sldId id="262" r:id="rId12"/>
-    <p:sldId id="263" r:id="rId13"/>
-    <p:sldId id="264" r:id="rId14"/>
-    <p:sldId id="266" r:id="rId15"/>
-    <p:sldId id="267" r:id="rId16"/>
-    <p:sldId id="268" r:id="rId17"/>
-    <p:sldId id="269" r:id="rId18"/>
-    <p:sldId id="275" r:id="rId19"/>
-    <p:sldId id="270" r:id="rId20"/>
-    <p:sldId id="265" r:id="rId21"/>
+    <p:sldId id="281" r:id="rId12"/>
+    <p:sldId id="262" r:id="rId13"/>
+    <p:sldId id="263" r:id="rId14"/>
+    <p:sldId id="264" r:id="rId15"/>
+    <p:sldId id="280" r:id="rId16"/>
+    <p:sldId id="266" r:id="rId17"/>
+    <p:sldId id="267" r:id="rId18"/>
+    <p:sldId id="268" r:id="rId19"/>
+    <p:sldId id="269" r:id="rId20"/>
+    <p:sldId id="275" r:id="rId21"/>
+    <p:sldId id="270" r:id="rId22"/>
+    <p:sldId id="265" r:id="rId23"/>
   </p:sldIdLst>
   <p:sldSz cx="12192000" cy="6858000"/>
   <p:notesSz cx="6858000" cy="9144000"/>
@@ -227,7 +229,7 @@
           <a:p>
             <a:fld id="{C5D33CC1-A9BA-4EBB-A0F2-14785481E855}" type="datetimeFigureOut">
               <a:rPr lang="es-419" smtClean="0"/>
-              <a:t>15/5/2021</a:t>
+              <a:t>17/5/2021</a:t>
             </a:fld>
             <a:endParaRPr lang="es-419"/>
           </a:p>
@@ -886,7 +888,7 @@
           <a:p>
             <a:fld id="{C80C79EB-8D52-470A-9DC2-D18E42773825}" type="slidenum">
               <a:rPr lang="es-419" smtClean="0"/>
-              <a:t>12</a:t>
+              <a:t>13</a:t>
             </a:fld>
             <a:endParaRPr lang="es-419" dirty="0"/>
           </a:p>
@@ -970,7 +972,7 @@
           <a:p>
             <a:fld id="{C80C79EB-8D52-470A-9DC2-D18E42773825}" type="slidenum">
               <a:rPr lang="es-419" smtClean="0"/>
-              <a:t>13</a:t>
+              <a:t>14</a:t>
             </a:fld>
             <a:endParaRPr lang="es-419"/>
           </a:p>
@@ -1054,7 +1056,91 @@
           <a:p>
             <a:fld id="{C80C79EB-8D52-470A-9DC2-D18E42773825}" type="slidenum">
               <a:rPr lang="es-419" smtClean="0"/>
-              <a:t>14</a:t>
+              <a:t>15</a:t>
+            </a:fld>
+            <a:endParaRPr lang="es-419"/>
+          </a:p>
+        </p:txBody>
+      </p:sp>
+    </p:spTree>
+    <p:extLst>
+      <p:ext uri="{BB962C8B-B14F-4D97-AF65-F5344CB8AC3E}">
+        <p14:creationId xmlns:p14="http://schemas.microsoft.com/office/powerpoint/2010/main" val="1016546989"/>
+      </p:ext>
+    </p:extLst>
+  </p:cSld>
+  <p:clrMapOvr>
+    <a:masterClrMapping/>
+  </p:clrMapOvr>
+</p:notes>
+</file>
+
+<file path=ppt/notesSlides/notesSlide7.xml><?xml version="1.0" encoding="utf-8"?>
+<p:notes xmlns:a="http://schemas.openxmlformats.org/drawingml/2006/main" xmlns:r="http://schemas.openxmlformats.org/officeDocument/2006/relationships" xmlns:p="http://schemas.openxmlformats.org/presentationml/2006/main">
+  <p:cSld>
+    <p:spTree>
+      <p:nvGrpSpPr>
+        <p:cNvPr id="1" name=""/>
+        <p:cNvGrpSpPr/>
+        <p:nvPr/>
+      </p:nvGrpSpPr>
+      <p:grpSpPr>
+        <a:xfrm>
+          <a:off x="0" y="0"/>
+          <a:ext cx="0" cy="0"/>
+          <a:chOff x="0" y="0"/>
+          <a:chExt cx="0" cy="0"/>
+        </a:xfrm>
+      </p:grpSpPr>
+      <p:sp>
+        <p:nvSpPr>
+          <p:cNvPr id="2" name="Slide Image Placeholder 1"/>
+          <p:cNvSpPr>
+            <a:spLocks noGrp="1" noRot="1" noChangeAspect="1"/>
+          </p:cNvSpPr>
+          <p:nvPr>
+            <p:ph type="sldImg"/>
+          </p:nvPr>
+        </p:nvSpPr>
+        <p:spPr/>
+      </p:sp>
+      <p:sp>
+        <p:nvSpPr>
+          <p:cNvPr id="3" name="Notes Placeholder 2"/>
+          <p:cNvSpPr>
+            <a:spLocks noGrp="1"/>
+          </p:cNvSpPr>
+          <p:nvPr>
+            <p:ph type="body" idx="1"/>
+          </p:nvPr>
+        </p:nvSpPr>
+        <p:spPr/>
+        <p:txBody>
+          <a:bodyPr/>
+          <a:lstStyle/>
+          <a:p>
+            <a:endParaRPr lang="en-US" dirty="0"/>
+          </a:p>
+        </p:txBody>
+      </p:sp>
+      <p:sp>
+        <p:nvSpPr>
+          <p:cNvPr id="4" name="Slide Number Placeholder 3"/>
+          <p:cNvSpPr>
+            <a:spLocks noGrp="1"/>
+          </p:cNvSpPr>
+          <p:nvPr>
+            <p:ph type="sldNum" sz="quarter" idx="10"/>
+          </p:nvPr>
+        </p:nvSpPr>
+        <p:spPr/>
+        <p:txBody>
+          <a:bodyPr/>
+          <a:lstStyle/>
+          <a:p>
+            <a:fld id="{C80C79EB-8D52-470A-9DC2-D18E42773825}" type="slidenum">
+              <a:rPr lang="es-419" smtClean="0"/>
+              <a:t>16</a:t>
             </a:fld>
             <a:endParaRPr lang="es-419"/>
           </a:p>
@@ -1073,7 +1159,7 @@
 </p:notes>
 </file>
 
-<file path=ppt/notesSlides/notesSlide7.xml><?xml version="1.0" encoding="utf-8"?>
+<file path=ppt/notesSlides/notesSlide8.xml><?xml version="1.0" encoding="utf-8"?>
 <p:notes xmlns:a="http://schemas.openxmlformats.org/drawingml/2006/main" xmlns:r="http://schemas.openxmlformats.org/officeDocument/2006/relationships" xmlns:p="http://schemas.openxmlformats.org/presentationml/2006/main">
   <p:cSld>
     <p:spTree>
@@ -1378,7 +1464,7 @@
           <a:p>
             <a:fld id="{C80C79EB-8D52-470A-9DC2-D18E42773825}" type="slidenum">
               <a:rPr lang="es-419" smtClean="0"/>
-              <a:t>19</a:t>
+              <a:t>21</a:t>
             </a:fld>
             <a:endParaRPr lang="es-419"/>
           </a:p>
@@ -1583,7 +1669,7 @@
           <a:p>
             <a:fld id="{4AAD347D-5ACD-4C99-B74B-A9C85AD731AF}" type="datetimeFigureOut">
               <a:rPr lang="en-US" dirty="0"/>
-              <a:t>5/15/2021</a:t>
+              <a:t>5/17/2021</a:t>
             </a:fld>
             <a:endParaRPr lang="en-US" dirty="0"/>
           </a:p>
@@ -1853,7 +1939,7 @@
           <a:p>
             <a:fld id="{4509A250-FF31-4206-8172-F9D3106AACB1}" type="datetimeFigureOut">
               <a:rPr lang="en-US" dirty="0"/>
-              <a:t>5/15/2021</a:t>
+              <a:t>5/17/2021</a:t>
             </a:fld>
             <a:endParaRPr lang="en-US" dirty="0"/>
           </a:p>
@@ -2042,7 +2128,7 @@
           <a:p>
             <a:fld id="{4509A250-FF31-4206-8172-F9D3106AACB1}" type="datetimeFigureOut">
               <a:rPr lang="en-US" dirty="0"/>
-              <a:t>5/15/2021</a:t>
+              <a:t>5/17/2021</a:t>
             </a:fld>
             <a:endParaRPr lang="en-US" dirty="0"/>
           </a:p>
@@ -2310,7 +2396,7 @@
           <a:p>
             <a:fld id="{4509A250-FF31-4206-8172-F9D3106AACB1}" type="datetimeFigureOut">
               <a:rPr lang="en-US" dirty="0"/>
-              <a:t>5/15/2021</a:t>
+              <a:t>5/17/2021</a:t>
             </a:fld>
             <a:endParaRPr lang="en-US" dirty="0"/>
           </a:p>
@@ -2646,7 +2732,7 @@
           <a:p>
             <a:fld id="{4509A250-FF31-4206-8172-F9D3106AACB1}" type="datetimeFigureOut">
               <a:rPr lang="en-US" dirty="0"/>
-              <a:t>5/15/2021</a:t>
+              <a:t>5/17/2021</a:t>
             </a:fld>
             <a:endParaRPr lang="en-US" dirty="0"/>
           </a:p>
@@ -3264,7 +3350,7 @@
           <a:p>
             <a:fld id="{4509A250-FF31-4206-8172-F9D3106AACB1}" type="datetimeFigureOut">
               <a:rPr lang="en-US" dirty="0"/>
-              <a:t>5/15/2021</a:t>
+              <a:t>5/17/2021</a:t>
             </a:fld>
             <a:endParaRPr lang="en-US" dirty="0"/>
           </a:p>
@@ -4119,7 +4205,7 @@
           <a:p>
             <a:fld id="{4509A250-FF31-4206-8172-F9D3106AACB1}" type="datetimeFigureOut">
               <a:rPr lang="en-US" dirty="0"/>
-              <a:t>5/15/2021</a:t>
+              <a:t>5/17/2021</a:t>
             </a:fld>
             <a:endParaRPr lang="en-US" dirty="0"/>
           </a:p>
@@ -4284,7 +4370,7 @@
           <a:p>
             <a:fld id="{4509A250-FF31-4206-8172-F9D3106AACB1}" type="datetimeFigureOut">
               <a:rPr lang="en-US" dirty="0"/>
-              <a:t>5/15/2021</a:t>
+              <a:t>5/17/2021</a:t>
             </a:fld>
             <a:endParaRPr lang="en-US" dirty="0"/>
           </a:p>
@@ -4459,7 +4545,7 @@
           <a:p>
             <a:fld id="{4509A250-FF31-4206-8172-F9D3106AACB1}" type="datetimeFigureOut">
               <a:rPr lang="en-US" dirty="0"/>
-              <a:t>5/15/2021</a:t>
+              <a:t>5/17/2021</a:t>
             </a:fld>
             <a:endParaRPr lang="en-US" dirty="0"/>
           </a:p>
@@ -4624,7 +4710,7 @@
           <a:p>
             <a:fld id="{4509A250-FF31-4206-8172-F9D3106AACB1}" type="datetimeFigureOut">
               <a:rPr lang="en-US" dirty="0"/>
-              <a:t>5/15/2021</a:t>
+              <a:t>5/17/2021</a:t>
             </a:fld>
             <a:endParaRPr lang="en-US" dirty="0"/>
           </a:p>
@@ -4866,7 +4952,7 @@
           <a:p>
             <a:fld id="{9796027F-7875-4030-9381-8BD8C4F21935}" type="datetimeFigureOut">
               <a:rPr lang="en-US" dirty="0"/>
-              <a:t>5/15/2021</a:t>
+              <a:t>5/17/2021</a:t>
             </a:fld>
             <a:endParaRPr lang="en-US" dirty="0"/>
           </a:p>
@@ -5153,7 +5239,7 @@
           <a:p>
             <a:fld id="{9796027F-7875-4030-9381-8BD8C4F21935}" type="datetimeFigureOut">
               <a:rPr lang="en-US" dirty="0"/>
-              <a:t>5/15/2021</a:t>
+              <a:t>5/17/2021</a:t>
             </a:fld>
             <a:endParaRPr lang="en-US" dirty="0"/>
           </a:p>
@@ -5592,7 +5678,7 @@
           <a:p>
             <a:fld id="{9796027F-7875-4030-9381-8BD8C4F21935}" type="datetimeFigureOut">
               <a:rPr lang="en-US" dirty="0"/>
-              <a:t>5/15/2021</a:t>
+              <a:t>5/17/2021</a:t>
             </a:fld>
             <a:endParaRPr lang="en-US" dirty="0"/>
           </a:p>
@@ -5705,7 +5791,7 @@
           <a:p>
             <a:fld id="{4509A250-FF31-4206-8172-F9D3106AACB1}" type="datetimeFigureOut">
               <a:rPr lang="en-US" dirty="0"/>
-              <a:t>5/15/2021</a:t>
+              <a:t>5/17/2021</a:t>
             </a:fld>
             <a:endParaRPr lang="en-US" dirty="0"/>
           </a:p>
@@ -5795,7 +5881,7 @@
           <a:p>
             <a:fld id="{4509A250-FF31-4206-8172-F9D3106AACB1}" type="datetimeFigureOut">
               <a:rPr lang="en-US" dirty="0"/>
-              <a:t>5/15/2021</a:t>
+              <a:t>5/17/2021</a:t>
             </a:fld>
             <a:endParaRPr lang="en-US" dirty="0"/>
           </a:p>
@@ -6069,7 +6155,7 @@
           <a:p>
             <a:fld id="{4509A250-FF31-4206-8172-F9D3106AACB1}" type="datetimeFigureOut">
               <a:rPr lang="en-US" dirty="0"/>
-              <a:t>5/15/2021</a:t>
+              <a:t>5/17/2021</a:t>
             </a:fld>
             <a:endParaRPr lang="en-US" dirty="0"/>
           </a:p>
@@ -6339,7 +6425,7 @@
           <a:p>
             <a:fld id="{4509A250-FF31-4206-8172-F9D3106AACB1}" type="datetimeFigureOut">
               <a:rPr lang="en-US" dirty="0"/>
-              <a:t>5/15/2021</a:t>
+              <a:t>5/17/2021</a:t>
             </a:fld>
             <a:endParaRPr lang="en-US" dirty="0"/>
           </a:p>
@@ -6763,7 +6849,7 @@
           <a:p>
             <a:fld id="{4AAD347D-5ACD-4C99-B74B-A9C85AD731AF}" type="datetimeFigureOut">
               <a:rPr lang="en-US" dirty="0"/>
-              <a:t>5/15/2021</a:t>
+              <a:t>5/17/2021</a:t>
             </a:fld>
             <a:endParaRPr lang="en-US" dirty="0"/>
           </a:p>
@@ -7453,13 +7539,45 @@
           <a:p>
             <a:r>
               <a:rPr lang="es-ES" dirty="0" smtClean="0"/>
-              <a:t>En el caso de la primera formulación el espacio de búsqueda contempla muchas soluciones que son equivalentes pues para el problema interesa la distribución de los colores y no el nombre de la etiqueta (del color) que se les da.</a:t>
-            </a:r>
-          </a:p>
-          <a:p>
+              <a:t>En el caso de la primera </a:t>
+            </a:r>
             <a:r>
               <a:rPr lang="es-ES" dirty="0" smtClean="0"/>
-              <a:t>Con la segunda formulación al plantearlo como un problema de distribución se resuelve este problema, pues elimina las soluciones simétricas, reduciendo considerablemente el espacio de búsqueda</a:t>
+              <a:t>formulación, </a:t>
+            </a:r>
+            <a:r>
+              <a:rPr lang="es-ES" dirty="0" smtClean="0"/>
+              <a:t>el espacio de búsqueda contempla muchas soluciones que son </a:t>
+            </a:r>
+            <a:r>
+              <a:rPr lang="es-ES" dirty="0" smtClean="0"/>
+              <a:t>equivalentes, </a:t>
+            </a:r>
+            <a:r>
+              <a:rPr lang="es-ES" dirty="0" smtClean="0"/>
+              <a:t>pues para el problema interesa la diferenciación de los colores y no el nombre de la etiqueta (del color) como tal.</a:t>
+            </a:r>
+          </a:p>
+          <a:p>
+            <a:r>
+              <a:rPr lang="es-ES" dirty="0" smtClean="0"/>
+              <a:t>Con la segunda </a:t>
+            </a:r>
+            <a:r>
+              <a:rPr lang="es-ES" dirty="0" smtClean="0"/>
+              <a:t>formulación, </a:t>
+            </a:r>
+            <a:r>
+              <a:rPr lang="es-ES" dirty="0" smtClean="0"/>
+              <a:t>al plantearlo como un problema de </a:t>
+            </a:r>
+            <a:r>
+              <a:rPr lang="es-ES" dirty="0" smtClean="0"/>
+              <a:t>distribución </a:t>
+            </a:r>
+            <a:r>
+              <a:rPr lang="es-ES" dirty="0" smtClean="0"/>
+              <a:t>se resuelve este problema, pues elimina las soluciones simétricas, reduciendo considerablemente el espacio de búsqueda</a:t>
             </a:r>
             <a:endParaRPr lang="es-ES" dirty="0"/>
           </a:p>
@@ -7848,6 +7966,229 @@
             <p:ph type="title"/>
           </p:nvPr>
         </p:nvSpPr>
+        <p:spPr/>
+        <p:txBody>
+          <a:bodyPr/>
+          <a:lstStyle/>
+          <a:p>
+            <a:r>
+              <a:rPr lang="en-US" dirty="0" err="1" smtClean="0"/>
+              <a:t>Casos</a:t>
+            </a:r>
+            <a:r>
+              <a:rPr lang="en-US" dirty="0" smtClean="0"/>
+              <a:t> </a:t>
+            </a:r>
+            <a:r>
+              <a:rPr lang="en-US" dirty="0" err="1" smtClean="0"/>
+              <a:t>Especiales</a:t>
+            </a:r>
+            <a:r>
+              <a:rPr lang="en-US" dirty="0" smtClean="0"/>
+              <a:t> de </a:t>
+            </a:r>
+            <a:r>
+              <a:rPr lang="en-US" dirty="0" err="1" smtClean="0"/>
+              <a:t>Grafos</a:t>
+            </a:r>
+            <a:endParaRPr lang="es-419" dirty="0"/>
+          </a:p>
+        </p:txBody>
+      </p:sp>
+      <p:sp>
+        <p:nvSpPr>
+          <p:cNvPr id="3" name="Content Placeholder 2"/>
+          <p:cNvSpPr>
+            <a:spLocks noGrp="1"/>
+          </p:cNvSpPr>
+          <p:nvPr>
+            <p:ph idx="1"/>
+          </p:nvPr>
+        </p:nvSpPr>
+        <p:spPr/>
+        <p:txBody>
+          <a:bodyPr/>
+          <a:lstStyle/>
+          <a:p>
+            <a:r>
+              <a:rPr lang="en-US" dirty="0" err="1" smtClean="0"/>
+              <a:t>Completos</a:t>
+            </a:r>
+            <a:endParaRPr lang="en-US" dirty="0" smtClean="0"/>
+          </a:p>
+          <a:p>
+            <a:r>
+              <a:rPr lang="en-US" dirty="0" err="1" smtClean="0"/>
+              <a:t>Bipartitos</a:t>
+            </a:r>
+            <a:endParaRPr lang="en-US" dirty="0" smtClean="0"/>
+          </a:p>
+          <a:p>
+            <a:r>
+              <a:rPr lang="en-US" dirty="0" err="1" smtClean="0"/>
+              <a:t>Ciclicos</a:t>
+            </a:r>
+            <a:endParaRPr lang="en-US" dirty="0"/>
+          </a:p>
+          <a:p>
+            <a:r>
+              <a:rPr lang="en-US" dirty="0" smtClean="0"/>
+              <a:t>Wheel(</a:t>
+            </a:r>
+            <a:r>
+              <a:rPr lang="en-US" dirty="0" err="1" smtClean="0"/>
+              <a:t>rueda</a:t>
+            </a:r>
+            <a:r>
+              <a:rPr lang="en-US" dirty="0" smtClean="0"/>
+              <a:t> no </a:t>
+            </a:r>
+            <a:r>
+              <a:rPr lang="en-US" dirty="0" err="1" smtClean="0"/>
+              <a:t>creo</a:t>
+            </a:r>
+            <a:r>
+              <a:rPr lang="en-US" dirty="0" smtClean="0"/>
+              <a:t> q sea la </a:t>
+            </a:r>
+            <a:r>
+              <a:rPr lang="en-US" dirty="0" err="1" smtClean="0"/>
+              <a:t>traducci</a:t>
+            </a:r>
+            <a:r>
+              <a:rPr lang="es-ES" dirty="0" err="1" smtClean="0"/>
+              <a:t>ón</a:t>
+            </a:r>
+            <a:r>
+              <a:rPr lang="en-US" dirty="0" smtClean="0"/>
+              <a:t>)</a:t>
+            </a:r>
+          </a:p>
+          <a:p>
+            <a:r>
+              <a:rPr lang="en-US" dirty="0" err="1" smtClean="0"/>
+              <a:t>Planos</a:t>
+            </a:r>
+            <a:endParaRPr lang="en-US" dirty="0" smtClean="0"/>
+          </a:p>
+          <a:p>
+            <a:r>
+              <a:rPr lang="en-US" dirty="0" smtClean="0"/>
+              <a:t>Grid(</a:t>
+            </a:r>
+            <a:r>
+              <a:rPr lang="en-US" dirty="0" err="1" smtClean="0"/>
+              <a:t>buscar</a:t>
+            </a:r>
+            <a:r>
+              <a:rPr lang="en-US" dirty="0" smtClean="0"/>
+              <a:t> que </a:t>
+            </a:r>
+            <a:r>
+              <a:rPr lang="en-US" dirty="0" err="1" smtClean="0"/>
+              <a:t>traducci</a:t>
+            </a:r>
+            <a:r>
+              <a:rPr lang="es-ES" dirty="0" err="1" smtClean="0"/>
+              <a:t>ó</a:t>
+            </a:r>
+            <a:r>
+              <a:rPr lang="en-US" dirty="0" smtClean="0"/>
+              <a:t>n se </a:t>
+            </a:r>
+            <a:r>
+              <a:rPr lang="en-US" dirty="0" err="1" smtClean="0"/>
+              <a:t>emplea</a:t>
+            </a:r>
+            <a:r>
+              <a:rPr lang="en-US" dirty="0" smtClean="0"/>
+              <a:t> </a:t>
+            </a:r>
+            <a:r>
+              <a:rPr lang="en-US" dirty="0" err="1" smtClean="0"/>
+              <a:t>aquí</a:t>
+            </a:r>
+            <a:r>
+              <a:rPr lang="en-US" dirty="0" smtClean="0"/>
+              <a:t> </a:t>
+            </a:r>
+            <a:r>
+              <a:rPr lang="en-US" dirty="0" err="1" smtClean="0"/>
+              <a:t>si</a:t>
+            </a:r>
+            <a:r>
+              <a:rPr lang="en-US" dirty="0" smtClean="0"/>
+              <a:t> </a:t>
+            </a:r>
+            <a:r>
+              <a:rPr lang="en-US" dirty="0" err="1" smtClean="0"/>
+              <a:t>puede</a:t>
+            </a:r>
+            <a:r>
+              <a:rPr lang="en-US" dirty="0" smtClean="0"/>
+              <a:t> que sea </a:t>
+            </a:r>
+            <a:r>
+              <a:rPr lang="en-US" dirty="0" err="1" smtClean="0"/>
+              <a:t>rejilla</a:t>
+            </a:r>
+            <a:r>
+              <a:rPr lang="en-US" dirty="0" smtClean="0"/>
+              <a:t>)</a:t>
+            </a:r>
+          </a:p>
+          <a:p>
+            <a:endParaRPr lang="es-419" dirty="0"/>
+          </a:p>
+        </p:txBody>
+      </p:sp>
+    </p:spTree>
+    <p:extLst>
+      <p:ext uri="{BB962C8B-B14F-4D97-AF65-F5344CB8AC3E}">
+        <p14:creationId xmlns:p14="http://schemas.microsoft.com/office/powerpoint/2010/main" val="3195596983"/>
+      </p:ext>
+    </p:extLst>
+  </p:cSld>
+  <p:clrMapOvr>
+    <a:masterClrMapping/>
+  </p:clrMapOvr>
+  <p:timing>
+    <p:tnLst>
+      <p:par>
+        <p:cTn id="1" dur="indefinite" restart="never" nodeType="tmRoot"/>
+      </p:par>
+    </p:tnLst>
+  </p:timing>
+</p:sld>
+</file>
+
+<file path=ppt/slides/slide12.xml><?xml version="1.0" encoding="utf-8"?>
+<p:sld xmlns:a="http://schemas.openxmlformats.org/drawingml/2006/main" xmlns:r="http://schemas.openxmlformats.org/officeDocument/2006/relationships" xmlns:p="http://schemas.openxmlformats.org/presentationml/2006/main">
+  <p:cSld>
+    <p:spTree>
+      <p:nvGrpSpPr>
+        <p:cNvPr id="1" name=""/>
+        <p:cNvGrpSpPr/>
+        <p:nvPr/>
+      </p:nvGrpSpPr>
+      <p:grpSpPr>
+        <a:xfrm>
+          <a:off x="0" y="0"/>
+          <a:ext cx="0" cy="0"/>
+          <a:chOff x="0" y="0"/>
+          <a:chExt cx="0" cy="0"/>
+        </a:xfrm>
+      </p:grpSpPr>
+      <p:sp>
+        <p:nvSpPr>
+          <p:cNvPr id="2" name="Title 1"/>
+          <p:cNvSpPr>
+            <a:spLocks noGrp="1"/>
+          </p:cNvSpPr>
+          <p:nvPr>
+            <p:ph type="title"/>
+          </p:nvPr>
+        </p:nvSpPr>
         <p:spPr>
           <a:xfrm>
             <a:off x="1490172" y="2562872"/>
@@ -7898,7 +8239,7 @@
 </p:sld>
 </file>
 
-<file path=ppt/slides/slide12.xml><?xml version="1.0" encoding="utf-8"?>
+<file path=ppt/slides/slide13.xml><?xml version="1.0" encoding="utf-8"?>
 <p:sld xmlns:a="http://schemas.openxmlformats.org/drawingml/2006/main" xmlns:r="http://schemas.openxmlformats.org/officeDocument/2006/relationships" xmlns:p="http://schemas.openxmlformats.org/presentationml/2006/main">
   <p:cSld>
     <p:spTree>
@@ -8746,8 +9087,8 @@
 </p:sld>
 </file>
 
-<file path=ppt/slides/slide13.xml><?xml version="1.0" encoding="utf-8"?>
-<p:sld xmlns:a="http://schemas.openxmlformats.org/drawingml/2006/main" xmlns:r="http://schemas.openxmlformats.org/officeDocument/2006/relationships" xmlns:p="http://schemas.openxmlformats.org/presentationml/2006/main">
+<file path=ppt/slides/slide14.xml><?xml version="1.0" encoding="utf-8"?>
+<p:sld xmlns:a="http://schemas.openxmlformats.org/drawingml/2006/main" xmlns:r="http://schemas.openxmlformats.org/officeDocument/2006/relationships" xmlns:p="http://schemas.openxmlformats.org/presentationml/2006/main" show="0">
   <p:cSld>
     <p:spTree>
       <p:nvGrpSpPr>
@@ -9634,6 +9975,14 @@
   <p:clrMapOvr>
     <a:masterClrMapping/>
   </p:clrMapOvr>
+  <mc:AlternateContent xmlns:mc="http://schemas.openxmlformats.org/markup-compatibility/2006" xmlns:p14="http://schemas.microsoft.com/office/powerpoint/2010/main">
+    <mc:Choice Requires="p14">
+      <p:transition spd="slow" p14:dur="2000"/>
+    </mc:Choice>
+    <mc:Fallback xmlns="">
+      <p:transition spd="slow"/>
+    </mc:Fallback>
+  </mc:AlternateContent>
   <p:timing>
     <p:tnLst>
       <p:par>
@@ -9644,7 +9993,905 @@
 </p:sld>
 </file>
 
-<file path=ppt/slides/slide14.xml><?xml version="1.0" encoding="utf-8"?>
+<file path=ppt/slides/slide15.xml><?xml version="1.0" encoding="utf-8"?>
+<p:sld xmlns:a="http://schemas.openxmlformats.org/drawingml/2006/main" xmlns:r="http://schemas.openxmlformats.org/officeDocument/2006/relationships" xmlns:p="http://schemas.openxmlformats.org/presentationml/2006/main">
+  <p:cSld>
+    <p:spTree>
+      <p:nvGrpSpPr>
+        <p:cNvPr id="1" name=""/>
+        <p:cNvGrpSpPr/>
+        <p:nvPr/>
+      </p:nvGrpSpPr>
+      <p:grpSpPr>
+        <a:xfrm>
+          <a:off x="0" y="0"/>
+          <a:ext cx="0" cy="0"/>
+          <a:chOff x="0" y="0"/>
+          <a:chExt cx="0" cy="0"/>
+        </a:xfrm>
+      </p:grpSpPr>
+      <p:sp>
+        <p:nvSpPr>
+          <p:cNvPr id="2" name="Title 1"/>
+          <p:cNvSpPr>
+            <a:spLocks noGrp="1"/>
+          </p:cNvSpPr>
+          <p:nvPr>
+            <p:ph type="title"/>
+          </p:nvPr>
+        </p:nvSpPr>
+        <p:spPr>
+          <a:xfrm>
+            <a:off x="646111" y="291353"/>
+            <a:ext cx="9404723" cy="1400530"/>
+          </a:xfrm>
+        </p:spPr>
+        <p:txBody>
+          <a:bodyPr/>
+          <a:lstStyle/>
+          <a:p>
+            <a:r>
+              <a:rPr lang="es-ES" dirty="0"/>
+              <a:t>E</a:t>
+            </a:r>
+            <a:r>
+              <a:rPr lang="es-ES" dirty="0" smtClean="0"/>
+              <a:t>nfoque </a:t>
+            </a:r>
+            <a:r>
+              <a:rPr lang="es-ES" dirty="0"/>
+              <a:t>heurístico de solución</a:t>
+            </a:r>
+            <a:r>
+              <a:rPr lang="es-ES" dirty="0" smtClean="0"/>
+              <a:t>:</a:t>
+            </a:r>
+            <a:br>
+              <a:rPr lang="es-ES" dirty="0" smtClean="0"/>
+            </a:br>
+            <a:r>
+              <a:rPr lang="es-ES" dirty="0"/>
+              <a:t/>
+            </a:r>
+            <a:br>
+              <a:rPr lang="es-ES" dirty="0"/>
+            </a:br>
+            <a:endParaRPr lang="en-US" dirty="0"/>
+          </a:p>
+        </p:txBody>
+      </p:sp>
+      <mc:AlternateContent xmlns:mc="http://schemas.openxmlformats.org/markup-compatibility/2006" xmlns:a14="http://schemas.microsoft.com/office/drawing/2010/main">
+        <mc:Choice Requires="a14">
+          <p:sp>
+            <p:nvSpPr>
+              <p:cNvPr id="3" name="Content Placeholder 2"/>
+              <p:cNvSpPr>
+                <a:spLocks noGrp="1"/>
+              </p:cNvSpPr>
+              <p:nvPr>
+                <p:ph idx="1"/>
+              </p:nvPr>
+            </p:nvSpPr>
+            <p:spPr>
+              <a:xfrm>
+                <a:off x="788894" y="1570531"/>
+                <a:ext cx="10542494" cy="5056094"/>
+              </a:xfrm>
+            </p:spPr>
+            <p:txBody>
+              <a:bodyPr>
+                <a:normAutofit fontScale="62500" lnSpcReduction="20000"/>
+              </a:bodyPr>
+              <a:lstStyle/>
+              <a:p>
+                <a:pPr marL="0" indent="0">
+                  <a:buNone/>
+                </a:pPr>
+                <a:r>
+                  <a:rPr lang="es-ES" sz="2900" dirty="0" smtClean="0"/>
+                  <a:t>Algoritmo </a:t>
+                </a:r>
+                <a:r>
+                  <a:rPr lang="es-ES" sz="2900" dirty="0"/>
+                  <a:t>voraz para la coloración de </a:t>
+                </a:r>
+                <a:r>
+                  <a:rPr lang="es-ES" sz="2900" dirty="0" smtClean="0"/>
+                  <a:t>nodos</a:t>
+                </a:r>
+              </a:p>
+              <a:p>
+                <a:pPr marL="0" indent="0">
+                  <a:buNone/>
+                </a:pPr>
+                <a:endParaRPr lang="en-US" sz="2900" dirty="0"/>
+              </a:p>
+              <a:p>
+                <a:pPr marL="0" indent="0">
+                  <a:buNone/>
+                </a:pPr>
+                <a:r>
+                  <a:rPr lang="es-ES" sz="2900" dirty="0" err="1" smtClean="0"/>
+                  <a:t>Greedy</a:t>
+                </a:r>
+                <a:r>
+                  <a:rPr lang="es-ES" sz="2900" dirty="0" smtClean="0"/>
+                  <a:t> </a:t>
+                </a:r>
+                <a:r>
+                  <a:rPr lang="es-ES" sz="2900" dirty="0"/>
+                  <a:t>(S </a:t>
+                </a:r>
+                <a14:m>
+                  <m:oMath xmlns:m="http://schemas.openxmlformats.org/officeDocument/2006/math">
+                    <m:r>
+                      <a:rPr lang="es-ES" sz="2900" i="1">
+                        <a:latin typeface="Cambria Math" panose="02040503050406030204" pitchFamily="18" charset="0"/>
+                      </a:rPr>
+                      <m:t>←</m:t>
+                    </m:r>
+                  </m:oMath>
+                </a14:m>
+                <a:r>
+                  <a:rPr lang="es-ES" sz="2900" dirty="0"/>
+                  <a:t> ø,</a:t>
+                </a:r>
+                <a14:m>
+                  <m:oMath xmlns:m="http://schemas.openxmlformats.org/officeDocument/2006/math">
+                    <m:r>
+                      <a:rPr lang="es-ES" sz="2900" i="1">
+                        <a:latin typeface="Cambria Math" panose="02040503050406030204" pitchFamily="18" charset="0"/>
+                      </a:rPr>
+                      <m:t>𝜋</m:t>
+                    </m:r>
+                  </m:oMath>
+                </a14:m>
+                <a:r>
+                  <a:rPr lang="es-ES" sz="2900" dirty="0"/>
+                  <a:t>)</a:t>
+                </a:r>
+                <a:endParaRPr lang="en-US" sz="2900" dirty="0"/>
+              </a:p>
+              <a:p>
+                <a:pPr marL="0" indent="0">
+                  <a:buNone/>
+                </a:pPr>
+                <a:r>
+                  <a:rPr lang="en-US" sz="2900" b="1" dirty="0"/>
+                  <a:t>for </a:t>
+                </a:r>
+                <a:r>
+                  <a:rPr lang="en-US" sz="2900" dirty="0"/>
+                  <a:t>i</a:t>
+                </a:r>
+                <a14:m>
+                  <m:oMath xmlns:m="http://schemas.openxmlformats.org/officeDocument/2006/math">
+                    <m:r>
+                      <a:rPr lang="en-US" sz="2900" i="1">
+                        <a:latin typeface="Cambria Math" panose="02040503050406030204" pitchFamily="18" charset="0"/>
+                      </a:rPr>
+                      <m:t>←1</m:t>
+                    </m:r>
+                  </m:oMath>
+                </a14:m>
+                <a:r>
+                  <a:rPr lang="en-US" sz="2900" b="1" dirty="0"/>
+                  <a:t>to </a:t>
+                </a:r>
+                <a:r>
+                  <a:rPr lang="en-US" sz="2900" dirty="0"/>
+                  <a:t>|</a:t>
+                </a:r>
+                <a14:m>
+                  <m:oMath xmlns:m="http://schemas.openxmlformats.org/officeDocument/2006/math">
+                    <m:r>
+                      <a:rPr lang="en-US" sz="2900" i="1">
+                        <a:latin typeface="Cambria Math" panose="02040503050406030204" pitchFamily="18" charset="0"/>
+                      </a:rPr>
+                      <m:t>𝜋</m:t>
+                    </m:r>
+                  </m:oMath>
+                </a14:m>
+                <a:r>
+                  <a:rPr lang="en-US" sz="2900" dirty="0"/>
+                  <a:t>| </a:t>
+                </a:r>
+                <a:r>
+                  <a:rPr lang="en-US" sz="2900" b="1" dirty="0"/>
+                  <a:t>do</a:t>
+                </a:r>
+                <a:endParaRPr lang="en-US" sz="2900" dirty="0"/>
+              </a:p>
+              <a:p>
+                <a:pPr marL="0" indent="0">
+                  <a:buNone/>
+                </a:pPr>
+                <a:r>
+                  <a:rPr lang="en-US" sz="2900" b="1" dirty="0" smtClean="0"/>
+                  <a:t>	for</a:t>
+                </a:r>
+                <a:r>
+                  <a:rPr lang="en-US" sz="2900" dirty="0" smtClean="0"/>
+                  <a:t> </a:t>
+                </a:r>
+                <a:r>
+                  <a:rPr lang="en-US" sz="2900" dirty="0"/>
+                  <a:t>j</a:t>
+                </a:r>
+                <a14:m>
+                  <m:oMath xmlns:m="http://schemas.openxmlformats.org/officeDocument/2006/math">
+                    <m:r>
+                      <a:rPr lang="en-US" sz="2900" i="1">
+                        <a:latin typeface="Cambria Math" panose="02040503050406030204" pitchFamily="18" charset="0"/>
+                      </a:rPr>
+                      <m:t>←</m:t>
+                    </m:r>
+                  </m:oMath>
+                </a14:m>
+                <a:r>
+                  <a:rPr lang="en-US" sz="2900" dirty="0"/>
+                  <a:t>1 </a:t>
+                </a:r>
+                <a:r>
+                  <a:rPr lang="en-US" sz="2900" b="1" dirty="0"/>
+                  <a:t>to</a:t>
+                </a:r>
+                <a:r>
+                  <a:rPr lang="en-US" sz="2900" dirty="0"/>
+                  <a:t> |S|</a:t>
+                </a:r>
+              </a:p>
+              <a:p>
+                <a:pPr marL="0" indent="0">
+                  <a:buNone/>
+                </a:pPr>
+                <a:r>
+                  <a:rPr lang="en-US" sz="2900" dirty="0"/>
+                  <a:t>		</a:t>
+                </a:r>
+                <a:r>
+                  <a:rPr lang="en-US" sz="2900" b="1" dirty="0"/>
+                  <a:t>if</a:t>
+                </a:r>
+                <a:r>
+                  <a:rPr lang="en-US" sz="2900" dirty="0"/>
+                  <a:t>(</a:t>
+                </a:r>
+                <a14:m>
+                  <m:oMath xmlns:m="http://schemas.openxmlformats.org/officeDocument/2006/math">
+                    <m:sSub>
+                      <m:sSubPr>
+                        <m:ctrlPr>
+                          <a:rPr lang="en-US" sz="2900" i="1">
+                            <a:latin typeface="Cambria Math" panose="02040503050406030204" pitchFamily="18" charset="0"/>
+                          </a:rPr>
+                        </m:ctrlPr>
+                      </m:sSubPr>
+                      <m:e>
+                        <m:r>
+                          <a:rPr lang="es-ES" sz="2900" i="1">
+                            <a:latin typeface="Cambria Math" panose="02040503050406030204" pitchFamily="18" charset="0"/>
+                          </a:rPr>
+                          <m:t>𝑆</m:t>
+                        </m:r>
+                      </m:e>
+                      <m:sub>
+                        <m:r>
+                          <a:rPr lang="es-ES" sz="2900" i="1">
+                            <a:latin typeface="Cambria Math" panose="02040503050406030204" pitchFamily="18" charset="0"/>
+                          </a:rPr>
+                          <m:t>𝑗</m:t>
+                        </m:r>
+                        <m:r>
+                          <a:rPr lang="es-ES" sz="2900" i="1">
+                            <a:latin typeface="Cambria Math" panose="02040503050406030204" pitchFamily="18" charset="0"/>
+                          </a:rPr>
+                          <m:t> </m:t>
+                        </m:r>
+                      </m:sub>
+                    </m:sSub>
+                    <m:r>
+                      <a:rPr lang="en-US" sz="2900" i="1">
+                        <a:latin typeface="Cambria Math" panose="02040503050406030204" pitchFamily="18" charset="0"/>
+                      </a:rPr>
+                      <m:t>∪{</m:t>
+                    </m:r>
+                    <m:sSub>
+                      <m:sSubPr>
+                        <m:ctrlPr>
+                          <a:rPr lang="en-US" sz="2900" i="1">
+                            <a:latin typeface="Cambria Math" panose="02040503050406030204" pitchFamily="18" charset="0"/>
+                          </a:rPr>
+                        </m:ctrlPr>
+                      </m:sSubPr>
+                      <m:e>
+                        <m:r>
+                          <a:rPr lang="es-ES" sz="2900" i="1">
+                            <a:latin typeface="Cambria Math" panose="02040503050406030204" pitchFamily="18" charset="0"/>
+                          </a:rPr>
+                          <m:t>𝜋</m:t>
+                        </m:r>
+                      </m:e>
+                      <m:sub>
+                        <m:r>
+                          <a:rPr lang="es-ES" sz="2900" i="1">
+                            <a:latin typeface="Cambria Math" panose="02040503050406030204" pitchFamily="18" charset="0"/>
+                          </a:rPr>
+                          <m:t>𝑖</m:t>
+                        </m:r>
+                      </m:sub>
+                    </m:sSub>
+                    <m:r>
+                      <a:rPr lang="en-US" sz="2900" i="1">
+                        <a:latin typeface="Cambria Math" panose="02040503050406030204" pitchFamily="18" charset="0"/>
+                      </a:rPr>
+                      <m:t>}) </m:t>
+                    </m:r>
+                    <m:r>
+                      <a:rPr lang="es-ES" sz="2900" i="1">
+                        <a:latin typeface="Cambria Math" panose="02040503050406030204" pitchFamily="18" charset="0"/>
+                      </a:rPr>
+                      <m:t>𝑖𝑠</m:t>
+                    </m:r>
+                    <m:r>
+                      <a:rPr lang="es-ES" sz="2900" i="1">
+                        <a:latin typeface="Cambria Math" panose="02040503050406030204" pitchFamily="18" charset="0"/>
+                      </a:rPr>
+                      <m:t> </m:t>
+                    </m:r>
+                    <m:r>
+                      <a:rPr lang="es-ES" sz="2900" i="1">
+                        <a:latin typeface="Cambria Math" panose="02040503050406030204" pitchFamily="18" charset="0"/>
+                      </a:rPr>
+                      <m:t>𝑎𝑛</m:t>
+                    </m:r>
+                    <m:r>
+                      <a:rPr lang="es-ES" sz="2900" i="1">
+                        <a:latin typeface="Cambria Math" panose="02040503050406030204" pitchFamily="18" charset="0"/>
+                      </a:rPr>
+                      <m:t> </m:t>
+                    </m:r>
+                    <m:r>
+                      <a:rPr lang="es-ES" sz="2900" i="1">
+                        <a:latin typeface="Cambria Math" panose="02040503050406030204" pitchFamily="18" charset="0"/>
+                      </a:rPr>
+                      <m:t>𝑖𝑛𝑑𝑒𝑝𝑒𝑛𝑑𝑒𝑛𝑡</m:t>
+                    </m:r>
+                    <m:r>
+                      <a:rPr lang="es-ES" sz="2900" i="1">
+                        <a:latin typeface="Cambria Math" panose="02040503050406030204" pitchFamily="18" charset="0"/>
+                      </a:rPr>
+                      <m:t> </m:t>
+                    </m:r>
+                    <m:r>
+                      <a:rPr lang="es-ES" sz="2900" i="1">
+                        <a:latin typeface="Cambria Math" panose="02040503050406030204" pitchFamily="18" charset="0"/>
+                      </a:rPr>
+                      <m:t>𝑠𝑒𝑡</m:t>
+                    </m:r>
+                    <m:r>
+                      <a:rPr lang="es-ES" sz="2900" i="1">
+                        <a:latin typeface="Cambria Math" panose="02040503050406030204" pitchFamily="18" charset="0"/>
+                      </a:rPr>
+                      <m:t> </m:t>
+                    </m:r>
+                    <m:r>
+                      <a:rPr lang="es-ES" sz="2900" b="1" i="1">
+                        <a:latin typeface="Cambria Math" panose="02040503050406030204" pitchFamily="18" charset="0"/>
+                      </a:rPr>
+                      <m:t>𝒕𝒉𝒆𝒏</m:t>
+                    </m:r>
+                  </m:oMath>
+                </a14:m>
+                <a:endParaRPr lang="en-US" sz="2900" dirty="0"/>
+              </a:p>
+              <a:p>
+                <a:pPr marL="0" indent="0">
+                  <a:buNone/>
+                </a:pPr>
+                <a:r>
+                  <a:rPr lang="en-US" sz="2900" b="1" dirty="0"/>
+                  <a:t>			</a:t>
+                </a:r>
+                <a14:m>
+                  <m:oMath xmlns:m="http://schemas.openxmlformats.org/officeDocument/2006/math">
+                    <m:sSub>
+                      <m:sSubPr>
+                        <m:ctrlPr>
+                          <a:rPr lang="en-US" sz="2900" i="1">
+                            <a:latin typeface="Cambria Math" panose="02040503050406030204" pitchFamily="18" charset="0"/>
+                          </a:rPr>
+                        </m:ctrlPr>
+                      </m:sSubPr>
+                      <m:e>
+                        <m:r>
+                          <a:rPr lang="es-ES" sz="2900" i="1">
+                            <a:latin typeface="Cambria Math" panose="02040503050406030204" pitchFamily="18" charset="0"/>
+                          </a:rPr>
+                          <m:t>𝑆</m:t>
+                        </m:r>
+                      </m:e>
+                      <m:sub>
+                        <m:r>
+                          <a:rPr lang="es-ES" sz="2900" i="1">
+                            <a:latin typeface="Cambria Math" panose="02040503050406030204" pitchFamily="18" charset="0"/>
+                          </a:rPr>
+                          <m:t>𝑗</m:t>
+                        </m:r>
+                      </m:sub>
+                    </m:sSub>
+                    <m:r>
+                      <a:rPr lang="es-ES" sz="2900" i="1">
+                        <a:latin typeface="Cambria Math" panose="02040503050406030204" pitchFamily="18" charset="0"/>
+                      </a:rPr>
+                      <m:t>←</m:t>
+                    </m:r>
+                    <m:sSub>
+                      <m:sSubPr>
+                        <m:ctrlPr>
+                          <a:rPr lang="en-US" sz="2900" i="1">
+                            <a:latin typeface="Cambria Math" panose="02040503050406030204" pitchFamily="18" charset="0"/>
+                          </a:rPr>
+                        </m:ctrlPr>
+                      </m:sSubPr>
+                      <m:e>
+                        <m:r>
+                          <a:rPr lang="es-ES" sz="2900" i="1">
+                            <a:latin typeface="Cambria Math" panose="02040503050406030204" pitchFamily="18" charset="0"/>
+                          </a:rPr>
+                          <m:t>𝑆</m:t>
+                        </m:r>
+                      </m:e>
+                      <m:sub>
+                        <m:r>
+                          <a:rPr lang="es-ES" sz="2900" i="1">
+                            <a:latin typeface="Cambria Math" panose="02040503050406030204" pitchFamily="18" charset="0"/>
+                          </a:rPr>
+                          <m:t>𝑗</m:t>
+                        </m:r>
+                      </m:sub>
+                    </m:sSub>
+                    <m:r>
+                      <a:rPr lang="es-ES" sz="2900" i="1">
+                        <a:latin typeface="Cambria Math" panose="02040503050406030204" pitchFamily="18" charset="0"/>
+                      </a:rPr>
+                      <m:t>∪{</m:t>
+                    </m:r>
+                    <m:sSub>
+                      <m:sSubPr>
+                        <m:ctrlPr>
+                          <a:rPr lang="en-US" sz="2900" i="1">
+                            <a:latin typeface="Cambria Math" panose="02040503050406030204" pitchFamily="18" charset="0"/>
+                          </a:rPr>
+                        </m:ctrlPr>
+                      </m:sSubPr>
+                      <m:e>
+                        <m:r>
+                          <a:rPr lang="es-ES" sz="2900" i="1">
+                            <a:latin typeface="Cambria Math" panose="02040503050406030204" pitchFamily="18" charset="0"/>
+                          </a:rPr>
+                          <m:t>𝜋</m:t>
+                        </m:r>
+                      </m:e>
+                      <m:sub>
+                        <m:r>
+                          <a:rPr lang="es-ES" sz="2900" i="1">
+                            <a:latin typeface="Cambria Math" panose="02040503050406030204" pitchFamily="18" charset="0"/>
+                          </a:rPr>
+                          <m:t>𝑖</m:t>
+                        </m:r>
+                      </m:sub>
+                    </m:sSub>
+                    <m:r>
+                      <a:rPr lang="es-ES" sz="2900" i="1">
+                        <a:latin typeface="Cambria Math" panose="02040503050406030204" pitchFamily="18" charset="0"/>
+                      </a:rPr>
+                      <m:t>}</m:t>
+                    </m:r>
+                  </m:oMath>
+                </a14:m>
+                <a:endParaRPr lang="en-US" sz="2900" dirty="0"/>
+              </a:p>
+              <a:p>
+                <a:pPr marL="0" indent="0">
+                  <a:buNone/>
+                </a:pPr>
+                <a:r>
+                  <a:rPr lang="es-ES" sz="2900" dirty="0"/>
+                  <a:t>			</a:t>
+                </a:r>
+                <a:r>
+                  <a:rPr lang="en-US" sz="2900" b="1" dirty="0"/>
+                  <a:t>break</a:t>
+                </a:r>
+                <a:endParaRPr lang="en-US" sz="2900" dirty="0"/>
+              </a:p>
+              <a:p>
+                <a:pPr marL="0" indent="0">
+                  <a:buNone/>
+                </a:pPr>
+                <a:r>
+                  <a:rPr lang="en-US" sz="2900" b="1" dirty="0"/>
+                  <a:t>		else </a:t>
+                </a:r>
+                <a14:m>
+                  <m:oMath xmlns:m="http://schemas.openxmlformats.org/officeDocument/2006/math">
+                    <m:r>
+                      <a:rPr lang="es-ES" sz="2900" i="1">
+                        <a:latin typeface="Cambria Math" panose="02040503050406030204" pitchFamily="18" charset="0"/>
+                      </a:rPr>
+                      <m:t>𝑗</m:t>
+                    </m:r>
+                    <m:r>
+                      <a:rPr lang="en-US" sz="2900" i="1">
+                        <a:latin typeface="Cambria Math" panose="02040503050406030204" pitchFamily="18" charset="0"/>
+                      </a:rPr>
+                      <m:t>←</m:t>
+                    </m:r>
+                    <m:r>
+                      <a:rPr lang="es-ES" sz="2900" i="1">
+                        <a:latin typeface="Cambria Math" panose="02040503050406030204" pitchFamily="18" charset="0"/>
+                      </a:rPr>
+                      <m:t>𝑗</m:t>
+                    </m:r>
+                    <m:r>
+                      <a:rPr lang="en-US" sz="2900" i="1">
+                        <a:latin typeface="Cambria Math" panose="02040503050406030204" pitchFamily="18" charset="0"/>
+                      </a:rPr>
+                      <m:t>+1</m:t>
+                    </m:r>
+                  </m:oMath>
+                </a14:m>
+                <a:endParaRPr lang="en-US" sz="2900" dirty="0"/>
+              </a:p>
+              <a:p>
+                <a:pPr marL="0" indent="0">
+                  <a:buNone/>
+                </a:pPr>
+                <a:r>
+                  <a:rPr lang="en-US" sz="2900" dirty="0"/>
+                  <a:t>	</a:t>
+                </a:r>
+                <a:r>
+                  <a:rPr lang="en-US" sz="2900" b="1" dirty="0"/>
+                  <a:t>if </a:t>
+                </a:r>
+                <a14:m>
+                  <m:oMath xmlns:m="http://schemas.openxmlformats.org/officeDocument/2006/math">
+                    <m:r>
+                      <a:rPr lang="es-ES" sz="2900" i="1">
+                        <a:latin typeface="Cambria Math" panose="02040503050406030204" pitchFamily="18" charset="0"/>
+                      </a:rPr>
+                      <m:t>𝑗</m:t>
+                    </m:r>
+                    <m:r>
+                      <a:rPr lang="en-US" sz="2900" i="1">
+                        <a:latin typeface="Cambria Math" panose="02040503050406030204" pitchFamily="18" charset="0"/>
+                      </a:rPr>
+                      <m:t>&gt;</m:t>
+                    </m:r>
+                    <m:d>
+                      <m:dPr>
+                        <m:begChr m:val="|"/>
+                        <m:endChr m:val="|"/>
+                        <m:ctrlPr>
+                          <a:rPr lang="en-US" sz="2900" i="1">
+                            <a:latin typeface="Cambria Math" panose="02040503050406030204" pitchFamily="18" charset="0"/>
+                          </a:rPr>
+                        </m:ctrlPr>
+                      </m:dPr>
+                      <m:e>
+                        <m:r>
+                          <a:rPr lang="es-ES" sz="2900" i="1">
+                            <a:latin typeface="Cambria Math" panose="02040503050406030204" pitchFamily="18" charset="0"/>
+                          </a:rPr>
+                          <m:t>𝑆</m:t>
+                        </m:r>
+                      </m:e>
+                    </m:d>
+                    <m:r>
+                      <a:rPr lang="es-ES" sz="2900" b="1" i="1">
+                        <a:latin typeface="Cambria Math" panose="02040503050406030204" pitchFamily="18" charset="0"/>
+                      </a:rPr>
+                      <m:t> </m:t>
+                    </m:r>
+                    <m:r>
+                      <a:rPr lang="es-ES" sz="2900" b="1" i="1">
+                        <a:latin typeface="Cambria Math" panose="02040503050406030204" pitchFamily="18" charset="0"/>
+                      </a:rPr>
+                      <m:t>𝒕𝒉𝒆𝒏</m:t>
+                    </m:r>
+                  </m:oMath>
+                </a14:m>
+                <a:endParaRPr lang="en-US" sz="2900" dirty="0"/>
+              </a:p>
+              <a:p>
+                <a:pPr marL="0" indent="0">
+                  <a:buNone/>
+                </a:pPr>
+                <a:r>
+                  <a:rPr lang="en-US" sz="2900" b="1" dirty="0"/>
+                  <a:t>		</a:t>
+                </a:r>
+                <a14:m>
+                  <m:oMath xmlns:m="http://schemas.openxmlformats.org/officeDocument/2006/math">
+                    <m:sSub>
+                      <m:sSubPr>
+                        <m:ctrlPr>
+                          <a:rPr lang="en-US" sz="2900" i="1">
+                            <a:latin typeface="Cambria Math" panose="02040503050406030204" pitchFamily="18" charset="0"/>
+                          </a:rPr>
+                        </m:ctrlPr>
+                      </m:sSubPr>
+                      <m:e>
+                        <m:r>
+                          <a:rPr lang="es-ES" sz="2900" i="1">
+                            <a:latin typeface="Cambria Math" panose="02040503050406030204" pitchFamily="18" charset="0"/>
+                          </a:rPr>
+                          <m:t>𝑆</m:t>
+                        </m:r>
+                      </m:e>
+                      <m:sub>
+                        <m:r>
+                          <a:rPr lang="es-ES" sz="2900" i="1">
+                            <a:latin typeface="Cambria Math" panose="02040503050406030204" pitchFamily="18" charset="0"/>
+                          </a:rPr>
+                          <m:t>𝑗</m:t>
+                        </m:r>
+                      </m:sub>
+                    </m:sSub>
+                    <m:r>
+                      <a:rPr lang="es-ES" sz="2900" i="1">
+                        <a:latin typeface="Cambria Math" panose="02040503050406030204" pitchFamily="18" charset="0"/>
+                      </a:rPr>
+                      <m:t>←{</m:t>
+                    </m:r>
+                    <m:sSub>
+                      <m:sSubPr>
+                        <m:ctrlPr>
+                          <a:rPr lang="en-US" sz="2900" i="1">
+                            <a:latin typeface="Cambria Math" panose="02040503050406030204" pitchFamily="18" charset="0"/>
+                          </a:rPr>
+                        </m:ctrlPr>
+                      </m:sSubPr>
+                      <m:e>
+                        <m:r>
+                          <a:rPr lang="es-ES" sz="2900" i="1">
+                            <a:latin typeface="Cambria Math" panose="02040503050406030204" pitchFamily="18" charset="0"/>
+                          </a:rPr>
+                          <m:t>𝜋</m:t>
+                        </m:r>
+                      </m:e>
+                      <m:sub>
+                        <m:r>
+                          <a:rPr lang="es-ES" sz="2900" i="1">
+                            <a:latin typeface="Cambria Math" panose="02040503050406030204" pitchFamily="18" charset="0"/>
+                          </a:rPr>
+                          <m:t>𝑖</m:t>
+                        </m:r>
+                      </m:sub>
+                    </m:sSub>
+                    <m:r>
+                      <a:rPr lang="es-ES" sz="2900" i="1">
+                        <a:latin typeface="Cambria Math" panose="02040503050406030204" pitchFamily="18" charset="0"/>
+                      </a:rPr>
+                      <m:t>}</m:t>
+                    </m:r>
+                  </m:oMath>
+                </a14:m>
+                <a:endParaRPr lang="en-US" sz="2900" dirty="0"/>
+              </a:p>
+              <a:p>
+                <a:pPr marL="0" indent="0">
+                  <a:buNone/>
+                </a:pPr>
+                <a:r>
+                  <a:rPr lang="es-ES" sz="2900" dirty="0"/>
+                  <a:t>		</a:t>
+                </a:r>
+                <a14:m>
+                  <m:oMath xmlns:m="http://schemas.openxmlformats.org/officeDocument/2006/math">
+                    <m:r>
+                      <a:rPr lang="es-ES" sz="2900" i="1">
+                        <a:latin typeface="Cambria Math" panose="02040503050406030204" pitchFamily="18" charset="0"/>
+                      </a:rPr>
+                      <m:t>𝑆</m:t>
+                    </m:r>
+                    <m:r>
+                      <a:rPr lang="es-ES" sz="2900" i="1">
+                        <a:latin typeface="Cambria Math" panose="02040503050406030204" pitchFamily="18" charset="0"/>
+                      </a:rPr>
+                      <m:t> ←</m:t>
+                    </m:r>
+                    <m:r>
+                      <a:rPr lang="es-ES" sz="2900" i="1">
+                        <a:latin typeface="Cambria Math" panose="02040503050406030204" pitchFamily="18" charset="0"/>
+                      </a:rPr>
+                      <m:t>𝑆</m:t>
+                    </m:r>
+                    <m:r>
+                      <a:rPr lang="es-ES" sz="2900" i="1">
+                        <a:latin typeface="Cambria Math" panose="02040503050406030204" pitchFamily="18" charset="0"/>
+                      </a:rPr>
+                      <m:t> ∪ </m:t>
+                    </m:r>
+                    <m:sSub>
+                      <m:sSubPr>
+                        <m:ctrlPr>
+                          <a:rPr lang="en-US" sz="2900" i="1">
+                            <a:latin typeface="Cambria Math" panose="02040503050406030204" pitchFamily="18" charset="0"/>
+                          </a:rPr>
+                        </m:ctrlPr>
+                      </m:sSubPr>
+                      <m:e>
+                        <m:r>
+                          <a:rPr lang="es-ES" sz="2900" i="1">
+                            <a:latin typeface="Cambria Math" panose="02040503050406030204" pitchFamily="18" charset="0"/>
+                          </a:rPr>
+                          <m:t>𝑆</m:t>
+                        </m:r>
+                      </m:e>
+                      <m:sub>
+                        <m:r>
+                          <a:rPr lang="es-ES" sz="2900" i="1">
+                            <a:latin typeface="Cambria Math" panose="02040503050406030204" pitchFamily="18" charset="0"/>
+                          </a:rPr>
+                          <m:t>𝑗</m:t>
+                        </m:r>
+                      </m:sub>
+                    </m:sSub>
+                  </m:oMath>
+                </a14:m>
+                <a:endParaRPr lang="en-US" sz="2900" dirty="0" smtClean="0"/>
+              </a:p>
+              <a:p>
+                <a:pPr marL="0" indent="0">
+                  <a:buNone/>
+                </a:pPr>
+                <a:endParaRPr lang="en-US" sz="2900" dirty="0"/>
+              </a:p>
+              <a:p>
+                <a:pPr marL="0" lvl="0" indent="0">
+                  <a:buNone/>
+                </a:pPr>
+                <a:r>
+                  <a:rPr lang="es-ES" sz="2900" dirty="0"/>
+                  <a:t>Partimos de la solución vacía S = ∅ y de una permutación aleatoria de los vértices </a:t>
+                </a:r>
+                <a14:m>
+                  <m:oMath xmlns:m="http://schemas.openxmlformats.org/officeDocument/2006/math">
+                    <m:r>
+                      <a:rPr lang="en-US" sz="2900" i="1">
+                        <a:latin typeface="Cambria Math" panose="02040503050406030204" pitchFamily="18" charset="0"/>
+                      </a:rPr>
+                      <m:t>𝜋</m:t>
+                    </m:r>
+                  </m:oMath>
+                </a14:m>
+                <a:r>
+                  <a:rPr lang="es-ES" sz="2900" dirty="0"/>
+                  <a:t>.</a:t>
+                </a:r>
+                <a:endParaRPr lang="en-US" sz="2900" dirty="0"/>
+              </a:p>
+              <a:p>
+                <a:endParaRPr lang="es-419" sz="2200" dirty="0"/>
+              </a:p>
+            </p:txBody>
+          </p:sp>
+        </mc:Choice>
+        <mc:Fallback xmlns="">
+          <p:sp>
+            <p:nvSpPr>
+              <p:cNvPr id="3" name="Content Placeholder 2"/>
+              <p:cNvSpPr>
+                <a:spLocks noGrp="1" noRot="1" noChangeAspect="1" noMove="1" noResize="1" noEditPoints="1" noAdjustHandles="1" noChangeArrowheads="1" noChangeShapeType="1" noTextEdit="1"/>
+              </p:cNvSpPr>
+              <p:nvPr>
+                <p:ph idx="1"/>
+              </p:nvPr>
+            </p:nvSpPr>
+            <p:spPr>
+              <a:xfrm>
+                <a:off x="788894" y="1570531"/>
+                <a:ext cx="10542494" cy="5056094"/>
+              </a:xfrm>
+              <a:blipFill>
+                <a:blip r:embed="rId3"/>
+                <a:stretch>
+                  <a:fillRect l="-462" t="-1809"/>
+                </a:stretch>
+              </a:blipFill>
+            </p:spPr>
+            <p:txBody>
+              <a:bodyPr/>
+              <a:lstStyle/>
+              <a:p>
+                <a:r>
+                  <a:rPr lang="es-419">
+                    <a:noFill/>
+                  </a:rPr>
+                  <a:t> </a:t>
+                </a:r>
+              </a:p>
+            </p:txBody>
+          </p:sp>
+        </mc:Fallback>
+      </mc:AlternateContent>
+      <p:sp>
+        <p:nvSpPr>
+          <p:cNvPr id="4" name="TextBox 3"/>
+          <p:cNvSpPr txBox="1"/>
+          <p:nvPr/>
+        </p:nvSpPr>
+        <p:spPr>
+          <a:xfrm>
+            <a:off x="6902824" y="2621250"/>
+            <a:ext cx="4876799" cy="1477328"/>
+          </a:xfrm>
+          <a:prstGeom prst="rect">
+            <a:avLst/>
+          </a:prstGeom>
+          <a:noFill/>
+        </p:spPr>
+        <p:txBody>
+          <a:bodyPr wrap="square" rtlCol="0">
+            <a:spAutoFit/>
+          </a:bodyPr>
+          <a:lstStyle/>
+          <a:p>
+            <a:pPr algn="r"/>
+            <a:r>
+              <a:rPr lang="es-ES" dirty="0"/>
+              <a:t>Referencia </a:t>
+            </a:r>
+            <a:r>
+              <a:rPr lang="es-ES" dirty="0" smtClean="0"/>
+              <a:t>bibliográfica:</a:t>
+            </a:r>
+          </a:p>
+          <a:p>
+            <a:endParaRPr lang="en-US" dirty="0"/>
+          </a:p>
+          <a:p>
+            <a:pPr algn="r"/>
+            <a:r>
+              <a:rPr lang="es-ES" dirty="0"/>
+              <a:t>Sergio Pena </a:t>
+            </a:r>
+            <a:r>
+              <a:rPr lang="es-ES" dirty="0" err="1"/>
+              <a:t>Seijas</a:t>
+            </a:r>
+            <a:r>
+              <a:rPr lang="es-ES" dirty="0"/>
+              <a:t>. Máster en Técnicas Estadísticas: El Problema de Coloración de Grafos. Curso 2016-2017.</a:t>
+            </a:r>
+            <a:endParaRPr lang="en-US" dirty="0"/>
+          </a:p>
+        </p:txBody>
+      </p:sp>
+    </p:spTree>
+    <p:extLst>
+      <p:ext uri="{BB962C8B-B14F-4D97-AF65-F5344CB8AC3E}">
+        <p14:creationId xmlns:p14="http://schemas.microsoft.com/office/powerpoint/2010/main" val="677247554"/>
+      </p:ext>
+    </p:extLst>
+  </p:cSld>
+  <p:clrMapOvr>
+    <a:masterClrMapping/>
+  </p:clrMapOvr>
+  <p:timing>
+    <p:tnLst>
+      <p:par>
+        <p:cTn id="1" dur="indefinite" restart="never" nodeType="tmRoot"/>
+      </p:par>
+    </p:tnLst>
+  </p:timing>
+</p:sld>
+</file>
+
+<file path=ppt/slides/slide16.xml><?xml version="1.0" encoding="utf-8"?>
 <p:sld xmlns:a="http://schemas.openxmlformats.org/drawingml/2006/main" xmlns:r="http://schemas.openxmlformats.org/officeDocument/2006/relationships" xmlns:p="http://schemas.openxmlformats.org/presentationml/2006/main">
   <p:cSld>
     <p:spTree>
@@ -10519,7 +11766,7 @@
 </p:sld>
 </file>
 
-<file path=ppt/slides/slide15.xml><?xml version="1.0" encoding="utf-8"?>
+<file path=ppt/slides/slide17.xml><?xml version="1.0" encoding="utf-8"?>
 <p:sld xmlns:a="http://schemas.openxmlformats.org/drawingml/2006/main" xmlns:r="http://schemas.openxmlformats.org/officeDocument/2006/relationships" xmlns:p="http://schemas.openxmlformats.org/presentationml/2006/main">
   <p:cSld>
     <p:spTree>
@@ -10830,7 +12077,7 @@
 </p:sld>
 </file>
 
-<file path=ppt/slides/slide16.xml><?xml version="1.0" encoding="utf-8"?>
+<file path=ppt/slides/slide18.xml><?xml version="1.0" encoding="utf-8"?>
 <p:sld xmlns:a="http://schemas.openxmlformats.org/drawingml/2006/main" xmlns:r="http://schemas.openxmlformats.org/officeDocument/2006/relationships" xmlns:p="http://schemas.openxmlformats.org/presentationml/2006/main">
   <p:cSld>
     <p:spTree>
@@ -11673,7 +12920,7 @@
 </p:sld>
 </file>
 
-<file path=ppt/slides/slide17.xml><?xml version="1.0" encoding="utf-8"?>
+<file path=ppt/slides/slide19.xml><?xml version="1.0" encoding="utf-8"?>
 <p:sld xmlns:a="http://schemas.openxmlformats.org/drawingml/2006/main" xmlns:r="http://schemas.openxmlformats.org/officeDocument/2006/relationships" xmlns:p="http://schemas.openxmlformats.org/presentationml/2006/main">
   <p:cSld>
     <p:spTree>
@@ -11974,7 +13221,93 @@
 </p:sld>
 </file>
 
-<file path=ppt/slides/slide18.xml><?xml version="1.0" encoding="utf-8"?>
+<file path=ppt/slides/slide2.xml><?xml version="1.0" encoding="utf-8"?>
+<p:sld xmlns:a="http://schemas.openxmlformats.org/drawingml/2006/main" xmlns:r="http://schemas.openxmlformats.org/officeDocument/2006/relationships" xmlns:p="http://schemas.openxmlformats.org/presentationml/2006/main">
+  <p:cSld>
+    <p:spTree>
+      <p:nvGrpSpPr>
+        <p:cNvPr id="1" name=""/>
+        <p:cNvGrpSpPr/>
+        <p:nvPr/>
+      </p:nvGrpSpPr>
+      <p:grpSpPr>
+        <a:xfrm>
+          <a:off x="0" y="0"/>
+          <a:ext cx="0" cy="0"/>
+          <a:chOff x="0" y="0"/>
+          <a:chExt cx="0" cy="0"/>
+        </a:xfrm>
+      </p:grpSpPr>
+      <p:sp>
+        <p:nvSpPr>
+          <p:cNvPr id="2" name="Title 1"/>
+          <p:cNvSpPr>
+            <a:spLocks noGrp="1"/>
+          </p:cNvSpPr>
+          <p:nvPr>
+            <p:ph type="title"/>
+          </p:nvPr>
+        </p:nvSpPr>
+        <p:spPr/>
+        <p:txBody>
+          <a:bodyPr/>
+          <a:lstStyle/>
+          <a:p>
+            <a:r>
+              <a:rPr lang="es-CU" dirty="0" smtClean="0"/>
+              <a:t>Problema</a:t>
+            </a:r>
+            <a:endParaRPr lang="es-419" dirty="0"/>
+          </a:p>
+        </p:txBody>
+      </p:sp>
+      <p:sp>
+        <p:nvSpPr>
+          <p:cNvPr id="3" name="Content Placeholder 2"/>
+          <p:cNvSpPr>
+            <a:spLocks noGrp="1"/>
+          </p:cNvSpPr>
+          <p:nvPr>
+            <p:ph idx="1"/>
+          </p:nvPr>
+        </p:nvSpPr>
+        <p:spPr/>
+        <p:txBody>
+          <a:bodyPr/>
+          <a:lstStyle/>
+          <a:p>
+            <a:pPr lvl="0"/>
+            <a:r>
+              <a:rPr lang="es-CU" dirty="0"/>
+              <a:t>Se tiene un grafo de entrada (nodos y enlaces) y hay que escoger qué color se asigna a cada nodo, de modo que ningún par de nodos adyacentes tengan el mismo color. Se debe usar la menor cantidad de colores.</a:t>
+            </a:r>
+          </a:p>
+          <a:p>
+            <a:endParaRPr lang="es-419" dirty="0"/>
+          </a:p>
+        </p:txBody>
+      </p:sp>
+    </p:spTree>
+    <p:extLst>
+      <p:ext uri="{BB962C8B-B14F-4D97-AF65-F5344CB8AC3E}">
+        <p14:creationId xmlns:p14="http://schemas.microsoft.com/office/powerpoint/2010/main" val="3178601984"/>
+      </p:ext>
+    </p:extLst>
+  </p:cSld>
+  <p:clrMapOvr>
+    <a:masterClrMapping/>
+  </p:clrMapOvr>
+  <p:timing>
+    <p:tnLst>
+      <p:par>
+        <p:cTn id="1" dur="indefinite" restart="never" nodeType="tmRoot"/>
+      </p:par>
+    </p:tnLst>
+  </p:timing>
+</p:sld>
+</file>
+
+<file path=ppt/slides/slide20.xml><?xml version="1.0" encoding="utf-8"?>
 <p:sld xmlns:a="http://schemas.openxmlformats.org/drawingml/2006/main" xmlns:r="http://schemas.openxmlformats.org/officeDocument/2006/relationships" xmlns:p="http://schemas.openxmlformats.org/presentationml/2006/main">
   <p:cSld>
     <p:spTree>
@@ -12628,7 +13961,7 @@
 </p:sld>
 </file>
 
-<file path=ppt/slides/slide19.xml><?xml version="1.0" encoding="utf-8"?>
+<file path=ppt/slides/slide21.xml><?xml version="1.0" encoding="utf-8"?>
 <p:sld xmlns:a="http://schemas.openxmlformats.org/drawingml/2006/main" xmlns:r="http://schemas.openxmlformats.org/officeDocument/2006/relationships" xmlns:p="http://schemas.openxmlformats.org/presentationml/2006/main">
   <p:cSld>
     <p:spTree>
@@ -13204,93 +14537,7 @@
 </p:sld>
 </file>
 
-<file path=ppt/slides/slide2.xml><?xml version="1.0" encoding="utf-8"?>
-<p:sld xmlns:a="http://schemas.openxmlformats.org/drawingml/2006/main" xmlns:r="http://schemas.openxmlformats.org/officeDocument/2006/relationships" xmlns:p="http://schemas.openxmlformats.org/presentationml/2006/main">
-  <p:cSld>
-    <p:spTree>
-      <p:nvGrpSpPr>
-        <p:cNvPr id="1" name=""/>
-        <p:cNvGrpSpPr/>
-        <p:nvPr/>
-      </p:nvGrpSpPr>
-      <p:grpSpPr>
-        <a:xfrm>
-          <a:off x="0" y="0"/>
-          <a:ext cx="0" cy="0"/>
-          <a:chOff x="0" y="0"/>
-          <a:chExt cx="0" cy="0"/>
-        </a:xfrm>
-      </p:grpSpPr>
-      <p:sp>
-        <p:nvSpPr>
-          <p:cNvPr id="2" name="Title 1"/>
-          <p:cNvSpPr>
-            <a:spLocks noGrp="1"/>
-          </p:cNvSpPr>
-          <p:nvPr>
-            <p:ph type="title"/>
-          </p:nvPr>
-        </p:nvSpPr>
-        <p:spPr/>
-        <p:txBody>
-          <a:bodyPr/>
-          <a:lstStyle/>
-          <a:p>
-            <a:r>
-              <a:rPr lang="es-CU" dirty="0" smtClean="0"/>
-              <a:t>Problema</a:t>
-            </a:r>
-            <a:endParaRPr lang="es-419" dirty="0"/>
-          </a:p>
-        </p:txBody>
-      </p:sp>
-      <p:sp>
-        <p:nvSpPr>
-          <p:cNvPr id="3" name="Content Placeholder 2"/>
-          <p:cNvSpPr>
-            <a:spLocks noGrp="1"/>
-          </p:cNvSpPr>
-          <p:nvPr>
-            <p:ph idx="1"/>
-          </p:nvPr>
-        </p:nvSpPr>
-        <p:spPr/>
-        <p:txBody>
-          <a:bodyPr/>
-          <a:lstStyle/>
-          <a:p>
-            <a:pPr lvl="0"/>
-            <a:r>
-              <a:rPr lang="es-CU" dirty="0"/>
-              <a:t>Se tiene un grafo de entrada (nodos y enlaces) y hay que escoger qué color se asigna a cada nodo, de modo que ningún par de nodos adyacentes tengan el mismo color. Se debe usar la menor cantidad de colores.</a:t>
-            </a:r>
-          </a:p>
-          <a:p>
-            <a:endParaRPr lang="es-419" dirty="0"/>
-          </a:p>
-        </p:txBody>
-      </p:sp>
-    </p:spTree>
-    <p:extLst>
-      <p:ext uri="{BB962C8B-B14F-4D97-AF65-F5344CB8AC3E}">
-        <p14:creationId xmlns:p14="http://schemas.microsoft.com/office/powerpoint/2010/main" val="3178601984"/>
-      </p:ext>
-    </p:extLst>
-  </p:cSld>
-  <p:clrMapOvr>
-    <a:masterClrMapping/>
-  </p:clrMapOvr>
-  <p:timing>
-    <p:tnLst>
-      <p:par>
-        <p:cTn id="1" dur="indefinite" restart="never" nodeType="tmRoot"/>
-      </p:par>
-    </p:tnLst>
-  </p:timing>
-</p:sld>
-</file>
-
-<file path=ppt/slides/slide20.xml><?xml version="1.0" encoding="utf-8"?>
+<file path=ppt/slides/slide22.xml><?xml version="1.0" encoding="utf-8"?>
 <p:sld xmlns:a="http://schemas.openxmlformats.org/drawingml/2006/main" xmlns:r="http://schemas.openxmlformats.org/officeDocument/2006/relationships" xmlns:p="http://schemas.openxmlformats.org/presentationml/2006/main">
   <p:cSld>
     <p:spTree>

</xml_diff>